<commit_message>
Some of the final revisions
- Changed the line for Talker B in Figure 1B in poster (will not be accounting for attention lapses at this time; keepin it simple)
- Polishing up Abstract for submission tonight (07.29)
- Updated R code for Figure 1B
</commit_message>
<xml_diff>
--- a/Fellowship Conference 2022/Poster_RS 07.29.pptx
+++ b/Fellowship Conference 2022/Poster_RS 07.29.pptx
@@ -3736,7 +3736,7 @@
               <a:t>the effects of </a:t>
             </a:r>
             <a:r>
-              <a:rPr lang="en-US" sz="3600" b="1" i="1" dirty="0">
+              <a:rPr lang="en-US" sz="3600" b="1" dirty="0">
                 <a:solidFill>
                   <a:srgbClr val="4D7000"/>
                 </a:solidFill>
@@ -3745,10 +3745,10 @@
                 <a:ea typeface="Calibri" panose="020F0502020204030204" pitchFamily="34" charset="0"/>
                 <a:cs typeface="Times New Roman" panose="02020603050405020304" pitchFamily="18" charset="0"/>
               </a:rPr>
-              <a:t>directing the listener’s attention to one talker</a:t>
-            </a:r>
-            <a:r>
-              <a:rPr lang="en-US" sz="3600" i="1" dirty="0">
+              <a:t>directing the listener’s attention to </a:t>
+            </a:r>
+            <a:r>
+              <a:rPr lang="en-US" sz="3600" b="1" i="1" dirty="0">
                 <a:solidFill>
                   <a:srgbClr val="4D7000"/>
                 </a:solidFill>
@@ -3757,6 +3757,18 @@
                 <a:ea typeface="Calibri" panose="020F0502020204030204" pitchFamily="34" charset="0"/>
                 <a:cs typeface="Times New Roman" panose="02020603050405020304" pitchFamily="18" charset="0"/>
               </a:rPr>
+              <a:t>one talker</a:t>
+            </a:r>
+            <a:r>
+              <a:rPr lang="en-US" sz="3600" i="1" dirty="0">
+                <a:solidFill>
+                  <a:srgbClr val="4D7000"/>
+                </a:solidFill>
+                <a:effectLst/>
+                <a:latin typeface="Amasis MT Pro" panose="02040504050005020304" pitchFamily="18" charset="0"/>
+                <a:ea typeface="Calibri" panose="020F0502020204030204" pitchFamily="34" charset="0"/>
+                <a:cs typeface="Times New Roman" panose="02020603050405020304" pitchFamily="18" charset="0"/>
+              </a:rPr>
               <a:t> </a:t>
             </a:r>
             <a:r>
@@ -3769,7 +3781,7 @@
               <a:t>on the listener’s </a:t>
             </a:r>
             <a:r>
-              <a:rPr lang="en-US" sz="3600" b="1" i="1" dirty="0">
+              <a:rPr lang="en-US" sz="3600" b="1" dirty="0">
                 <a:solidFill>
                   <a:srgbClr val="4D7000"/>
                 </a:solidFill>
@@ -3778,7 +3790,31 @@
                 <a:ea typeface="Calibri" panose="020F0502020204030204" pitchFamily="34" charset="0"/>
                 <a:cs typeface="Times New Roman" panose="02020603050405020304" pitchFamily="18" charset="0"/>
               </a:rPr>
-              <a:t>ability to adapt to both talkers.</a:t>
+              <a:t>ability to adapt to </a:t>
+            </a:r>
+            <a:r>
+              <a:rPr lang="en-US" sz="3600" b="1" i="1" dirty="0">
+                <a:solidFill>
+                  <a:srgbClr val="4D7000"/>
+                </a:solidFill>
+                <a:effectLst/>
+                <a:latin typeface="Amasis MT Pro" panose="02040504050005020304" pitchFamily="18" charset="0"/>
+                <a:ea typeface="Calibri" panose="020F0502020204030204" pitchFamily="34" charset="0"/>
+                <a:cs typeface="Times New Roman" panose="02020603050405020304" pitchFamily="18" charset="0"/>
+              </a:rPr>
+              <a:t>both talkers</a:t>
+            </a:r>
+            <a:r>
+              <a:rPr lang="en-US" sz="3600" b="1" dirty="0">
+                <a:solidFill>
+                  <a:srgbClr val="4D7000"/>
+                </a:solidFill>
+                <a:effectLst/>
+                <a:latin typeface="Amasis MT Pro" panose="02040504050005020304" pitchFamily="18" charset="0"/>
+                <a:ea typeface="Calibri" panose="020F0502020204030204" pitchFamily="34" charset="0"/>
+                <a:cs typeface="Times New Roman" panose="02020603050405020304" pitchFamily="18" charset="0"/>
+              </a:rPr>
+              <a:t>.</a:t>
             </a:r>
           </a:p>
         </p:txBody>
@@ -4869,7 +4905,7 @@
                 </a:solidFill>
                 <a:latin typeface="Amasis MT Pro" panose="02040504050005020304" pitchFamily="18" charset="0"/>
               </a:rPr>
-              <a:t>Participants will be instructed to attend to either the female talker or the male talker. They will then perform a series of 2-option forced-choice lexical decision tasks, in which they will hear a recording and then select if this talker said a word or a nonword (</a:t>
+              <a:t>Participants will be instructed to attend to either the female talker or the male talker. They will then perform a series of 2-option forced-choice lexical decision tasks, in which they will hear a recording and then select if the attended talker said a word or a nonword (</a:t>
             </a:r>
             <a:r>
               <a:rPr lang="en-US" sz="3600" i="1" dirty="0">
@@ -5621,7 +5657,7 @@
                 </a:solidFill>
                 <a:latin typeface="Amasis MT Pro" panose="02040504050005020304" pitchFamily="18" charset="0"/>
               </a:rPr>
-              <a:t>A listener’s perceptual boundary changing more to fit the attended talker’s speech than the unattended talker’s speech would suggest there are limits to the automaticity of speech perception, while conversely complete adaptation to both talkers would suggest that humans automatically adapt their perception to any speech in their environment.</a:t>
+              <a:t>A listener’s perceptual boundary changing more to fit the attended talker’s speech than the unattended talker’s speech would suggest there are limits to the automaticity of speech perception. Conversely, complete adaptation to both talkers would suggest that humans automatically adapt their perception to any speech in their environment.</a:t>
             </a:r>
           </a:p>
         </p:txBody>
@@ -6105,7 +6141,7 @@
                 </a:solidFill>
                 <a:latin typeface="Amasis MT Pro" panose="02040504050005020304" pitchFamily="18" charset="0"/>
               </a:rPr>
-              <a:t>). Each trial will only play a recording from a single voice at once. Participants will select if the audio they heard was “asi” or “ashi” for each trial, to produce results like the predictions, shown to the left. </a:t>
+              <a:t>). Each trial will only play a recording from a single voice at once. Participants will select if the audio they heard was “asi” or “ashi” for each trial to produce results like the predictions, shown to the left. </a:t>
             </a:r>
           </a:p>
         </p:txBody>
@@ -6560,7 +6596,7 @@
           <a:lstStyle/>
           <a:p>
             <a:r>
-              <a:rPr lang="en-US" sz="3100" dirty="0">
+              <a:rPr lang="en-US" sz="3000" dirty="0">
                 <a:solidFill>
                   <a:schemeClr val="tx1">
                     <a:lumMod val="85000"/>
@@ -6572,7 +6608,7 @@
               <a:t>Thank you to Dr. Tanya </a:t>
             </a:r>
             <a:r>
-              <a:rPr lang="en-US" sz="3100" dirty="0" err="1">
+              <a:rPr lang="en-US" sz="3000" dirty="0" err="1">
                 <a:solidFill>
                   <a:schemeClr val="tx1">
                     <a:lumMod val="85000"/>
@@ -6584,19 +6620,19 @@
               <a:t>Kraljic</a:t>
             </a:r>
             <a:r>
-              <a:rPr lang="en-US" sz="3100" dirty="0">
-                <a:solidFill>
-                  <a:schemeClr val="tx1">
-                    <a:lumMod val="85000"/>
-                    <a:lumOff val="15000"/>
-                  </a:schemeClr>
-                </a:solidFill>
-                <a:latin typeface="Amasis MT Pro" panose="02040504050005020304" pitchFamily="18" charset="0"/>
-              </a:rPr>
-              <a:t> and Dr. Arthur Samuel for permission to use the stimuli they had developed (</a:t>
-            </a:r>
-            <a:r>
-              <a:rPr lang="en-US" sz="3100" dirty="0" err="1">
+              <a:rPr lang="en-US" sz="3000" dirty="0">
+                <a:solidFill>
+                  <a:schemeClr val="tx1">
+                    <a:lumMod val="85000"/>
+                    <a:lumOff val="15000"/>
+                  </a:schemeClr>
+                </a:solidFill>
+                <a:latin typeface="Amasis MT Pro" panose="02040504050005020304" pitchFamily="18" charset="0"/>
+              </a:rPr>
+              <a:t> and Dr. Arthur Samuel for their permission to use the stimuli they developed (</a:t>
+            </a:r>
+            <a:r>
+              <a:rPr lang="en-US" sz="3000" dirty="0" err="1">
                 <a:solidFill>
                   <a:schemeClr val="tx1">
                     <a:lumMod val="85000"/>
@@ -6608,16 +6644,16 @@
               <a:t>Kraljic</a:t>
             </a:r>
             <a:r>
-              <a:rPr lang="en-US" sz="3100" dirty="0">
-                <a:solidFill>
-                  <a:schemeClr val="tx1">
-                    <a:lumMod val="85000"/>
-                    <a:lumOff val="15000"/>
-                  </a:schemeClr>
-                </a:solidFill>
-                <a:latin typeface="Amasis MT Pro" panose="02040504050005020304" pitchFamily="18" charset="0"/>
-              </a:rPr>
-              <a:t> &amp; Samuel, 2005), the 2022 Meliora Mentors, and the University of Rochester Brain &amp; Cognitive sciences department.</a:t>
+              <a:rPr lang="en-US" sz="3000" dirty="0">
+                <a:solidFill>
+                  <a:schemeClr val="tx1">
+                    <a:lumMod val="85000"/>
+                    <a:lumOff val="15000"/>
+                  </a:schemeClr>
+                </a:solidFill>
+                <a:latin typeface="Amasis MT Pro" panose="02040504050005020304" pitchFamily="18" charset="0"/>
+              </a:rPr>
+              <a:t> &amp; Samuel, 2005), the 2022 Meliora Mentors, the HLP Lab and the University of Rochester Brain &amp; Cognitive sciences department.</a:t>
             </a:r>
           </a:p>
         </p:txBody>
@@ -7150,7 +7186,7 @@
               <a:rPr lang="en-US" sz="2800" i="1" dirty="0">
                 <a:latin typeface="Amasis MT Pro" panose="02040504050005020304" pitchFamily="18" charset="0"/>
               </a:rPr>
-              <a:t>/), rather than “asi”  (/s/). If perceptual adaptation is dependent on attentional resources, we anticipate the listener will adjustment to the unattended talker will be constrained.</a:t>
+              <a:t>/), rather than “asi” (/s/). If perceptual adaptation is dependent on attentional resources, we anticipate listener’ adjustment to the unattended talker will be constrained.</a:t>
             </a:r>
           </a:p>
         </p:txBody>
@@ -7291,7 +7327,7 @@
               <a:rPr lang="en-US" sz="2800" i="1" dirty="0">
                 <a:latin typeface="Amasis MT Pro" panose="02040504050005020304" pitchFamily="18" charset="0"/>
               </a:rPr>
-              <a:t>Figure 4: A static representation of how a participant will progress through a trial. Each trial will begin with the participant hearing an audio file and then selecting either “Word” or “Nonword”.</a:t>
+              <a:t>Figure 4: A static representation of how a participant will progress through a trial. Each trial will begin with the participant hearing an audio file, and then selecting either “Word” or “Nonword”.</a:t>
             </a:r>
           </a:p>
         </p:txBody>
@@ -7346,87 +7382,66 @@
           </a:p>
         </p:txBody>
       </p:sp>
-      <p:grpSp>
-        <p:nvGrpSpPr>
-          <p:cNvPr id="19" name="Group 18">
+      <p:pic>
+        <p:nvPicPr>
+          <p:cNvPr id="15" name="Picture 14">
             <a:extLst>
               <a:ext uri="{FF2B5EF4-FFF2-40B4-BE49-F238E27FC236}">
-                <a16:creationId xmlns:a16="http://schemas.microsoft.com/office/drawing/2014/main" id="{E22245E3-EEB9-E849-7B02-B4D1C08983C1}"/>
+                <a16:creationId xmlns:a16="http://schemas.microsoft.com/office/drawing/2014/main" id="{E5752F50-4171-E972-6675-F89D10008D35}"/>
               </a:ext>
             </a:extLst>
           </p:cNvPr>
-          <p:cNvGrpSpPr/>
+          <p:cNvPicPr>
+            <a:picLocks noChangeAspect="1"/>
+          </p:cNvPicPr>
           <p:nvPr/>
-        </p:nvGrpSpPr>
-        <p:grpSpPr>
+        </p:nvPicPr>
+        <p:blipFill>
+          <a:blip r:embed="rId10"/>
+          <a:stretch>
+            <a:fillRect/>
+          </a:stretch>
+        </p:blipFill>
+        <p:spPr>
           <a:xfrm>
-            <a:off x="2634849" y="15808330"/>
-            <a:ext cx="11716895" cy="10437304"/>
-            <a:chOff x="1558990" y="14352071"/>
-            <a:chExt cx="11253002" cy="10681507"/>
+            <a:off x="2777316" y="15808330"/>
+            <a:ext cx="11431962" cy="5113434"/>
           </a:xfrm>
-        </p:grpSpPr>
-        <p:pic>
-          <p:nvPicPr>
-            <p:cNvPr id="15" name="Picture 14">
-              <a:extLst>
-                <a:ext uri="{FF2B5EF4-FFF2-40B4-BE49-F238E27FC236}">
-                  <a16:creationId xmlns:a16="http://schemas.microsoft.com/office/drawing/2014/main" id="{E5752F50-4171-E972-6675-F89D10008D35}"/>
-                </a:ext>
-              </a:extLst>
-            </p:cNvPr>
-            <p:cNvPicPr>
-              <a:picLocks noChangeAspect="1"/>
-            </p:cNvPicPr>
-            <p:nvPr/>
-          </p:nvPicPr>
-          <p:blipFill>
-            <a:blip r:embed="rId10"/>
-            <a:stretch>
-              <a:fillRect/>
-            </a:stretch>
-          </p:blipFill>
-          <p:spPr>
-            <a:xfrm>
-              <a:off x="1695816" y="14352071"/>
-              <a:ext cx="10979350" cy="5233074"/>
-            </a:xfrm>
-            <a:prstGeom prst="rect">
-              <a:avLst/>
-            </a:prstGeom>
-          </p:spPr>
-        </p:pic>
-        <p:pic>
-          <p:nvPicPr>
-            <p:cNvPr id="18" name="Picture 17">
-              <a:extLst>
-                <a:ext uri="{FF2B5EF4-FFF2-40B4-BE49-F238E27FC236}">
-                  <a16:creationId xmlns:a16="http://schemas.microsoft.com/office/drawing/2014/main" id="{49E0AFF1-819C-81BA-A9D2-AD4CD204FDE9}"/>
-                </a:ext>
-              </a:extLst>
-            </p:cNvPr>
-            <p:cNvPicPr>
-              <a:picLocks noChangeAspect="1"/>
-            </p:cNvPicPr>
-            <p:nvPr/>
-          </p:nvPicPr>
-          <p:blipFill>
-            <a:blip r:embed="rId11"/>
-            <a:stretch>
-              <a:fillRect/>
-            </a:stretch>
-          </p:blipFill>
-          <p:spPr>
-            <a:xfrm>
-              <a:off x="1558990" y="19255010"/>
-              <a:ext cx="11253002" cy="5778568"/>
-            </a:xfrm>
-            <a:prstGeom prst="rect">
-              <a:avLst/>
-            </a:prstGeom>
-          </p:spPr>
-        </p:pic>
-      </p:grpSp>
+          <a:prstGeom prst="rect">
+            <a:avLst/>
+          </a:prstGeom>
+        </p:spPr>
+      </p:pic>
+      <p:pic>
+        <p:nvPicPr>
+          <p:cNvPr id="10" name="Picture 9">
+            <a:extLst>
+              <a:ext uri="{FF2B5EF4-FFF2-40B4-BE49-F238E27FC236}">
+                <a16:creationId xmlns:a16="http://schemas.microsoft.com/office/drawing/2014/main" id="{7BACDFFE-0CC8-6D10-DD83-3077853481B6}"/>
+              </a:ext>
+            </a:extLst>
+          </p:cNvPr>
+          <p:cNvPicPr>
+            <a:picLocks noChangeAspect="1"/>
+          </p:cNvPicPr>
+          <p:nvPr/>
+        </p:nvPicPr>
+        <p:blipFill>
+          <a:blip r:embed="rId11"/>
+          <a:stretch>
+            <a:fillRect/>
+          </a:stretch>
+        </p:blipFill>
+        <p:spPr>
+          <a:xfrm>
+            <a:off x="2934571" y="20562573"/>
+            <a:ext cx="11200351" cy="5749229"/>
+          </a:xfrm>
+          <a:prstGeom prst="rect">
+            <a:avLst/>
+          </a:prstGeom>
+        </p:spPr>
+      </p:pic>
     </p:spTree>
     <p:extLst>
       <p:ext uri="{BB962C8B-B14F-4D97-AF65-F5344CB8AC3E}">

</xml_diff>

<commit_message>
Updated to Reflect Abstract Submission
</commit_message>
<xml_diff>
--- a/Fellowship Conference 2022/Poster_RS 07.29.pptx
+++ b/Fellowship Conference 2022/Poster_RS 07.29.pptx
@@ -3002,8 +3002,8 @@
         </p:nvSpPr>
         <p:spPr>
           <a:xfrm>
-            <a:off x="689680" y="10284139"/>
-            <a:ext cx="15297174" cy="882695"/>
+            <a:off x="689679" y="10284139"/>
+            <a:ext cx="15333105" cy="806098"/>
           </a:xfrm>
           <a:prstGeom prst="roundRect">
             <a:avLst/>
@@ -3380,8 +3380,8 @@
         </p:nvSpPr>
         <p:spPr>
           <a:xfrm>
-            <a:off x="16939399" y="4043716"/>
-            <a:ext cx="31119871" cy="871332"/>
+            <a:off x="16936458" y="4319973"/>
+            <a:ext cx="31119871" cy="813098"/>
           </a:xfrm>
           <a:prstGeom prst="roundRect">
             <a:avLst/>
@@ -3635,7 +3635,7 @@
           </a:bodyPr>
           <a:lstStyle/>
           <a:p>
-            <a:pPr marL="0" marR="0">
+            <a:pPr marL="0" marR="0" algn="just">
               <a:lnSpc>
                 <a:spcPct val="107000"/>
               </a:lnSpc>
@@ -3833,7 +3833,7 @@
         </p:nvSpPr>
         <p:spPr>
           <a:xfrm>
-            <a:off x="17302495" y="5639340"/>
+            <a:off x="17299554" y="5857363"/>
             <a:ext cx="30756775" cy="2308324"/>
           </a:xfrm>
           <a:prstGeom prst="rect">
@@ -3847,7 +3847,7 @@
           </a:bodyPr>
           <a:lstStyle/>
           <a:p>
-            <a:pPr algn="ctr"/>
+            <a:pPr algn="just"/>
             <a:r>
               <a:rPr lang="en-US" sz="3600" dirty="0">
                 <a:solidFill>
@@ -4043,7 +4043,7 @@
         </p:nvSpPr>
         <p:spPr>
           <a:xfrm>
-            <a:off x="20611717" y="4961296"/>
+            <a:off x="20608776" y="5179319"/>
             <a:ext cx="23873817" cy="677108"/>
           </a:xfrm>
           <a:prstGeom prst="rect">
@@ -4341,6 +4341,7 @@
             </a:r>
           </a:p>
           <a:p>
+            <a:pPr algn="just"/>
             <a:r>
               <a:rPr lang="en-US" sz="2700" dirty="0">
                 <a:solidFill>
@@ -4504,6 +4505,7 @@
           </a:bodyPr>
           <a:lstStyle/>
           <a:p>
+            <a:pPr algn="just"/>
             <a:r>
               <a:rPr lang="en-US" sz="3600" dirty="0">
                 <a:solidFill>
@@ -4649,6 +4651,7 @@
           </a:bodyPr>
           <a:lstStyle/>
           <a:p>
+            <a:pPr algn="just"/>
             <a:r>
               <a:rPr lang="en-US" sz="3600" dirty="0">
                 <a:solidFill>
@@ -4895,6 +4898,7 @@
           </a:bodyPr>
           <a:lstStyle/>
           <a:p>
+            <a:pPr algn="just"/>
             <a:r>
               <a:rPr lang="en-US" sz="3600" dirty="0">
                 <a:solidFill>
@@ -4953,7 +4957,7 @@
         </p:blipFill>
         <p:spPr>
           <a:xfrm>
-            <a:off x="41452435" y="11857289"/>
+            <a:off x="41627051" y="11632440"/>
             <a:ext cx="6572167" cy="11593595"/>
           </a:xfrm>
           <a:prstGeom prst="rect">
@@ -5138,6 +5142,7 @@
           </a:bodyPr>
           <a:lstStyle/>
           <a:p>
+            <a:pPr algn="just"/>
             <a:r>
               <a:rPr lang="en-US" sz="3600" dirty="0">
                 <a:latin typeface="Amasis MT Pro" panose="02040504050005020304" pitchFamily="18" charset="0"/>
@@ -5250,6 +5255,7 @@
           </a:bodyPr>
           <a:lstStyle/>
           <a:p>
+            <a:pPr algn="just"/>
             <a:r>
               <a:rPr lang="en-US" sz="3600" dirty="0">
                 <a:solidFill>
@@ -5422,6 +5428,7 @@
           </a:bodyPr>
           <a:lstStyle/>
           <a:p>
+            <a:pPr algn="just"/>
             <a:r>
               <a:rPr lang="en-US" sz="3600" b="1" dirty="0">
                 <a:solidFill>
@@ -5541,6 +5548,7 @@
           </a:bodyPr>
           <a:lstStyle/>
           <a:p>
+            <a:pPr algn="just"/>
             <a:r>
               <a:rPr lang="en-US" sz="3600" dirty="0">
                 <a:solidFill>
@@ -5647,6 +5655,7 @@
           </a:bodyPr>
           <a:lstStyle/>
           <a:p>
+            <a:pPr algn="just"/>
             <a:r>
               <a:rPr lang="en-US" sz="3800" dirty="0">
                 <a:solidFill>
@@ -6059,6 +6068,7 @@
           </a:bodyPr>
           <a:lstStyle/>
           <a:p>
+            <a:pPr algn="just"/>
             <a:r>
               <a:rPr lang="en-US" sz="3600" dirty="0">
                 <a:solidFill>
@@ -6515,7 +6525,7 @@
         <p:spPr>
           <a:xfrm>
             <a:off x="37245282" y="30693032"/>
-            <a:ext cx="9081904" cy="1477328"/>
+            <a:ext cx="8583002" cy="1477328"/>
           </a:xfrm>
           <a:prstGeom prst="rect">
             <a:avLst/>
@@ -6528,6 +6538,7 @@
           </a:bodyPr>
           <a:lstStyle/>
           <a:p>
+            <a:pPr algn="just"/>
             <a:r>
               <a:rPr lang="en-US" sz="3000" dirty="0">
                 <a:solidFill>
@@ -6595,6 +6606,7 @@
           </a:bodyPr>
           <a:lstStyle/>
           <a:p>
+            <a:pPr algn="just"/>
             <a:r>
               <a:rPr lang="en-US" sz="3000" dirty="0">
                 <a:solidFill>
@@ -6672,8 +6684,8 @@
         </p:nvSpPr>
         <p:spPr>
           <a:xfrm>
-            <a:off x="834487" y="14835406"/>
-            <a:ext cx="15228809" cy="752584"/>
+            <a:off x="834487" y="14781891"/>
+            <a:ext cx="15228809" cy="806099"/>
           </a:xfrm>
           <a:prstGeom prst="roundRect">
             <a:avLst/>
@@ -7137,7 +7149,7 @@
         </p:nvSpPr>
         <p:spPr>
           <a:xfrm>
-            <a:off x="872708" y="26245634"/>
+            <a:off x="795700" y="26385556"/>
             <a:ext cx="15252299" cy="1815882"/>
           </a:xfrm>
           <a:prstGeom prst="rect">
@@ -7396,16 +7408,15 @@
           </p:cNvPicPr>
           <p:nvPr/>
         </p:nvPicPr>
-        <p:blipFill>
+        <p:blipFill rotWithShape="1">
           <a:blip r:embed="rId10"/>
-          <a:stretch>
-            <a:fillRect/>
-          </a:stretch>
+          <a:srcRect b="7236"/>
+          <a:stretch/>
         </p:blipFill>
         <p:spPr>
           <a:xfrm>
-            <a:off x="2777316" y="15808330"/>
-            <a:ext cx="11431962" cy="5113434"/>
+            <a:off x="2834036" y="15587990"/>
+            <a:ext cx="11300888" cy="5104893"/>
           </a:xfrm>
           <a:prstGeom prst="rect">
             <a:avLst/>
@@ -7434,8 +7445,8 @@
         </p:blipFill>
         <p:spPr>
           <a:xfrm>
-            <a:off x="2934571" y="20562573"/>
-            <a:ext cx="11200351" cy="5749229"/>
+            <a:off x="2882423" y="20656381"/>
+            <a:ext cx="11300888" cy="5749229"/>
           </a:xfrm>
           <a:prstGeom prst="rect">
             <a:avLst/>

</xml_diff>